<commit_message>
sprint 1 - the trolley
</commit_message>
<xml_diff>
--- a/userDocs/img/final_task_schema.pptx
+++ b/userDocs/img/final_task_schema.pptx
@@ -11,6 +11,7 @@
     <p:sldId id="269" r:id="rId5"/>
     <p:sldId id="271" r:id="rId6"/>
     <p:sldId id="270" r:id="rId7"/>
+    <p:sldId id="277" r:id="rId8"/>
   </p:sldIdLst>
   <p:sldSz cx="12192000" cy="6858000"/>
   <p:notesSz cx="6858000" cy="9144000"/>
@@ -246,7 +247,7 @@
           <a:p>
             <a:fld id="{B54D5996-1787-4713-9AAF-D983FFC67929}" type="datetimeFigureOut">
               <a:rPr lang="it-IT" smtClean="0"/>
-              <a:t>25/06/2021</a:t>
+              <a:t>21/07/2021</a:t>
             </a:fld>
             <a:endParaRPr lang="it-IT"/>
           </a:p>
@@ -414,7 +415,7 @@
           <a:p>
             <a:fld id="{B54D5996-1787-4713-9AAF-D983FFC67929}" type="datetimeFigureOut">
               <a:rPr lang="it-IT" smtClean="0"/>
-              <a:t>25/06/2021</a:t>
+              <a:t>21/07/2021</a:t>
             </a:fld>
             <a:endParaRPr lang="it-IT"/>
           </a:p>
@@ -592,7 +593,7 @@
           <a:p>
             <a:fld id="{B54D5996-1787-4713-9AAF-D983FFC67929}" type="datetimeFigureOut">
               <a:rPr lang="it-IT" smtClean="0"/>
-              <a:t>25/06/2021</a:t>
+              <a:t>21/07/2021</a:t>
             </a:fld>
             <a:endParaRPr lang="it-IT"/>
           </a:p>
@@ -760,7 +761,7 @@
           <a:p>
             <a:fld id="{B54D5996-1787-4713-9AAF-D983FFC67929}" type="datetimeFigureOut">
               <a:rPr lang="it-IT" smtClean="0"/>
-              <a:t>25/06/2021</a:t>
+              <a:t>21/07/2021</a:t>
             </a:fld>
             <a:endParaRPr lang="it-IT"/>
           </a:p>
@@ -1005,7 +1006,7 @@
           <a:p>
             <a:fld id="{B54D5996-1787-4713-9AAF-D983FFC67929}" type="datetimeFigureOut">
               <a:rPr lang="it-IT" smtClean="0"/>
-              <a:t>25/06/2021</a:t>
+              <a:t>21/07/2021</a:t>
             </a:fld>
             <a:endParaRPr lang="it-IT"/>
           </a:p>
@@ -1234,7 +1235,7 @@
           <a:p>
             <a:fld id="{B54D5996-1787-4713-9AAF-D983FFC67929}" type="datetimeFigureOut">
               <a:rPr lang="it-IT" smtClean="0"/>
-              <a:t>25/06/2021</a:t>
+              <a:t>21/07/2021</a:t>
             </a:fld>
             <a:endParaRPr lang="it-IT"/>
           </a:p>
@@ -1598,7 +1599,7 @@
           <a:p>
             <a:fld id="{B54D5996-1787-4713-9AAF-D983FFC67929}" type="datetimeFigureOut">
               <a:rPr lang="it-IT" smtClean="0"/>
-              <a:t>25/06/2021</a:t>
+              <a:t>21/07/2021</a:t>
             </a:fld>
             <a:endParaRPr lang="it-IT"/>
           </a:p>
@@ -1715,7 +1716,7 @@
           <a:p>
             <a:fld id="{B54D5996-1787-4713-9AAF-D983FFC67929}" type="datetimeFigureOut">
               <a:rPr lang="it-IT" smtClean="0"/>
-              <a:t>25/06/2021</a:t>
+              <a:t>21/07/2021</a:t>
             </a:fld>
             <a:endParaRPr lang="it-IT"/>
           </a:p>
@@ -1810,7 +1811,7 @@
           <a:p>
             <a:fld id="{B54D5996-1787-4713-9AAF-D983FFC67929}" type="datetimeFigureOut">
               <a:rPr lang="it-IT" smtClean="0"/>
-              <a:t>25/06/2021</a:t>
+              <a:t>21/07/2021</a:t>
             </a:fld>
             <a:endParaRPr lang="it-IT"/>
           </a:p>
@@ -2085,7 +2086,7 @@
           <a:p>
             <a:fld id="{B54D5996-1787-4713-9AAF-D983FFC67929}" type="datetimeFigureOut">
               <a:rPr lang="it-IT" smtClean="0"/>
-              <a:t>25/06/2021</a:t>
+              <a:t>21/07/2021</a:t>
             </a:fld>
             <a:endParaRPr lang="it-IT"/>
           </a:p>
@@ -2337,7 +2338,7 @@
           <a:p>
             <a:fld id="{B54D5996-1787-4713-9AAF-D983FFC67929}" type="datetimeFigureOut">
               <a:rPr lang="it-IT" smtClean="0"/>
-              <a:t>25/06/2021</a:t>
+              <a:t>21/07/2021</a:t>
             </a:fld>
             <a:endParaRPr lang="it-IT"/>
           </a:p>
@@ -2548,7 +2549,7 @@
           <a:p>
             <a:fld id="{B54D5996-1787-4713-9AAF-D983FFC67929}" type="datetimeFigureOut">
               <a:rPr lang="it-IT" smtClean="0"/>
-              <a:t>25/06/2021</a:t>
+              <a:t>21/07/2021</a:t>
             </a:fld>
             <a:endParaRPr lang="it-IT"/>
           </a:p>
@@ -14163,6 +14164,743 @@
 </p:sld>
 </file>
 
+<file path=ppt/slides/slide7.xml><?xml version="1.0" encoding="utf-8"?>
+<p:sld xmlns:a="http://schemas.openxmlformats.org/drawingml/2006/main" xmlns:r="http://schemas.openxmlformats.org/officeDocument/2006/relationships" xmlns:p="http://schemas.openxmlformats.org/presentationml/2006/main">
+  <p:cSld>
+    <p:spTree>
+      <p:nvGrpSpPr>
+        <p:cNvPr id="1" name=""/>
+        <p:cNvGrpSpPr/>
+        <p:nvPr/>
+      </p:nvGrpSpPr>
+      <p:grpSpPr>
+        <a:xfrm>
+          <a:off x="0" y="0"/>
+          <a:ext cx="0" cy="0"/>
+          <a:chOff x="0" y="0"/>
+          <a:chExt cx="0" cy="0"/>
+        </a:xfrm>
+      </p:grpSpPr>
+      <p:grpSp>
+        <p:nvGrpSpPr>
+          <p:cNvPr id="60" name="Gruppo 59"/>
+          <p:cNvGrpSpPr/>
+          <p:nvPr/>
+        </p:nvGrpSpPr>
+        <p:grpSpPr>
+          <a:xfrm>
+            <a:off x="3312260" y="2486769"/>
+            <a:ext cx="1926426" cy="1214172"/>
+            <a:chOff x="402476" y="5184618"/>
+            <a:chExt cx="1926426" cy="1214172"/>
+          </a:xfrm>
+        </p:grpSpPr>
+        <p:sp>
+          <p:nvSpPr>
+            <p:cNvPr id="62" name="Ovale 61"/>
+            <p:cNvSpPr/>
+            <p:nvPr/>
+          </p:nvSpPr>
+          <p:spPr>
+            <a:xfrm>
+              <a:off x="667957" y="5332857"/>
+              <a:ext cx="1660945" cy="1065933"/>
+            </a:xfrm>
+            <a:prstGeom prst="ellipse">
+              <a:avLst/>
+            </a:prstGeom>
+            <a:solidFill>
+              <a:schemeClr val="accent2">
+                <a:lumMod val="20000"/>
+                <a:lumOff val="80000"/>
+              </a:schemeClr>
+            </a:solidFill>
+            <a:ln w="12700">
+              <a:solidFill>
+                <a:schemeClr val="tx1"/>
+              </a:solidFill>
+            </a:ln>
+          </p:spPr>
+          <p:style>
+            <a:lnRef idx="2">
+              <a:schemeClr val="accent1">
+                <a:shade val="50000"/>
+              </a:schemeClr>
+            </a:lnRef>
+            <a:fillRef idx="1">
+              <a:schemeClr val="accent1"/>
+            </a:fillRef>
+            <a:effectRef idx="0">
+              <a:schemeClr val="accent1"/>
+            </a:effectRef>
+            <a:fontRef idx="minor">
+              <a:schemeClr val="lt1"/>
+            </a:fontRef>
+          </p:style>
+          <p:txBody>
+            <a:bodyPr rtlCol="0" anchor="ctr"/>
+            <a:lstStyle/>
+            <a:p>
+              <a:pPr algn="ctr"/>
+              <a:r>
+                <a:rPr lang="it-IT" sz="1200" dirty="0" smtClean="0">
+                  <a:solidFill>
+                    <a:schemeClr val="tx1"/>
+                  </a:solidFill>
+                  <a:latin typeface="Century Schoolbook" panose="02040604050505020304" pitchFamily="18" charset="0"/>
+                </a:rPr>
+                <a:t>Trolley</a:t>
+              </a:r>
+            </a:p>
+            <a:p>
+              <a:pPr algn="ctr"/>
+              <a:r>
+                <a:rPr lang="it-IT" sz="1200" dirty="0" smtClean="0">
+                  <a:solidFill>
+                    <a:schemeClr val="tx1"/>
+                  </a:solidFill>
+                  <a:latin typeface="Century Schoolbook" panose="02040604050505020304" pitchFamily="18" charset="0"/>
+                </a:rPr>
+                <a:t>Actor</a:t>
+              </a:r>
+              <a:endParaRPr lang="it-IT" sz="1400" i="1" dirty="0">
+                <a:solidFill>
+                  <a:schemeClr val="tx1"/>
+                </a:solidFill>
+                <a:latin typeface="Century Schoolbook" panose="02040604050505020304" pitchFamily="18" charset="0"/>
+              </a:endParaRPr>
+            </a:p>
+          </p:txBody>
+        </p:sp>
+        <p:sp>
+          <p:nvSpPr>
+            <p:cNvPr id="63" name="Triangolo isoscele 62"/>
+            <p:cNvSpPr/>
+            <p:nvPr/>
+          </p:nvSpPr>
+          <p:spPr>
+            <a:xfrm rot="16200000">
+              <a:off x="1350190" y="5205064"/>
+              <a:ext cx="296478" cy="255585"/>
+            </a:xfrm>
+            <a:prstGeom prst="triangle">
+              <a:avLst/>
+            </a:prstGeom>
+            <a:solidFill>
+              <a:srgbClr val="FF0000"/>
+            </a:solidFill>
+            <a:ln w="12700">
+              <a:solidFill>
+                <a:schemeClr val="tx1"/>
+              </a:solidFill>
+            </a:ln>
+          </p:spPr>
+          <p:style>
+            <a:lnRef idx="2">
+              <a:schemeClr val="accent1">
+                <a:shade val="50000"/>
+              </a:schemeClr>
+            </a:lnRef>
+            <a:fillRef idx="1">
+              <a:schemeClr val="accent1"/>
+            </a:fillRef>
+            <a:effectRef idx="0">
+              <a:schemeClr val="accent1"/>
+            </a:effectRef>
+            <a:fontRef idx="minor">
+              <a:schemeClr val="lt1"/>
+            </a:fontRef>
+          </p:style>
+          <p:txBody>
+            <a:bodyPr rtlCol="0" anchor="ctr"/>
+            <a:lstStyle/>
+            <a:p>
+              <a:pPr algn="ctr"/>
+              <a:endParaRPr lang="it-IT"/>
+            </a:p>
+          </p:txBody>
+        </p:sp>
+        <p:sp>
+          <p:nvSpPr>
+            <p:cNvPr id="64" name="Rettangolo 63"/>
+            <p:cNvSpPr/>
+            <p:nvPr/>
+          </p:nvSpPr>
+          <p:spPr>
+            <a:xfrm>
+              <a:off x="402476" y="5739696"/>
+              <a:ext cx="530961" cy="252254"/>
+            </a:xfrm>
+            <a:prstGeom prst="rect">
+              <a:avLst/>
+            </a:prstGeom>
+            <a:solidFill>
+              <a:schemeClr val="accent2">
+                <a:lumMod val="20000"/>
+                <a:lumOff val="80000"/>
+              </a:schemeClr>
+            </a:solidFill>
+            <a:ln w="12700">
+              <a:solidFill>
+                <a:schemeClr val="tx1"/>
+              </a:solidFill>
+            </a:ln>
+          </p:spPr>
+          <p:style>
+            <a:lnRef idx="2">
+              <a:schemeClr val="accent1">
+                <a:shade val="50000"/>
+              </a:schemeClr>
+            </a:lnRef>
+            <a:fillRef idx="1">
+              <a:schemeClr val="accent1"/>
+            </a:fillRef>
+            <a:effectRef idx="0">
+              <a:schemeClr val="accent1"/>
+            </a:effectRef>
+            <a:fontRef idx="minor">
+              <a:schemeClr val="lt1"/>
+            </a:fontRef>
+          </p:style>
+          <p:txBody>
+            <a:bodyPr rtlCol="0" anchor="ctr"/>
+            <a:lstStyle/>
+            <a:p>
+              <a:pPr algn="ctr"/>
+              <a:endParaRPr lang="it-IT"/>
+            </a:p>
+          </p:txBody>
+        </p:sp>
+      </p:grpSp>
+      <p:grpSp>
+        <p:nvGrpSpPr>
+          <p:cNvPr id="65" name="Gruppo 64"/>
+          <p:cNvGrpSpPr/>
+          <p:nvPr/>
+        </p:nvGrpSpPr>
+        <p:grpSpPr>
+          <a:xfrm>
+            <a:off x="6313133" y="2486768"/>
+            <a:ext cx="1926426" cy="1214172"/>
+            <a:chOff x="402476" y="5184618"/>
+            <a:chExt cx="1926426" cy="1214172"/>
+          </a:xfrm>
+        </p:grpSpPr>
+        <p:sp>
+          <p:nvSpPr>
+            <p:cNvPr id="66" name="Ovale 65"/>
+            <p:cNvSpPr/>
+            <p:nvPr/>
+          </p:nvSpPr>
+          <p:spPr>
+            <a:xfrm>
+              <a:off x="667957" y="5332857"/>
+              <a:ext cx="1660945" cy="1065933"/>
+            </a:xfrm>
+            <a:prstGeom prst="ellipse">
+              <a:avLst/>
+            </a:prstGeom>
+            <a:solidFill>
+              <a:schemeClr val="accent2">
+                <a:lumMod val="20000"/>
+                <a:lumOff val="80000"/>
+              </a:schemeClr>
+            </a:solidFill>
+            <a:ln w="12700">
+              <a:solidFill>
+                <a:schemeClr val="tx1"/>
+              </a:solidFill>
+            </a:ln>
+          </p:spPr>
+          <p:style>
+            <a:lnRef idx="2">
+              <a:schemeClr val="accent1">
+                <a:shade val="50000"/>
+              </a:schemeClr>
+            </a:lnRef>
+            <a:fillRef idx="1">
+              <a:schemeClr val="accent1"/>
+            </a:fillRef>
+            <a:effectRef idx="0">
+              <a:schemeClr val="accent1"/>
+            </a:effectRef>
+            <a:fontRef idx="minor">
+              <a:schemeClr val="lt1"/>
+            </a:fontRef>
+          </p:style>
+          <p:txBody>
+            <a:bodyPr rtlCol="0" anchor="ctr"/>
+            <a:lstStyle/>
+            <a:p>
+              <a:pPr algn="ctr"/>
+              <a:r>
+                <a:rPr lang="it-IT" sz="1200" dirty="0" smtClean="0">
+                  <a:solidFill>
+                    <a:schemeClr val="tx1"/>
+                  </a:solidFill>
+                  <a:latin typeface="Century Schoolbook" panose="02040604050505020304" pitchFamily="18" charset="0"/>
+                </a:rPr>
+                <a:t>Basic</a:t>
+              </a:r>
+            </a:p>
+            <a:p>
+              <a:pPr algn="ctr"/>
+              <a:r>
+                <a:rPr lang="it-IT" sz="1200" dirty="0" smtClean="0">
+                  <a:solidFill>
+                    <a:schemeClr val="tx1"/>
+                  </a:solidFill>
+                  <a:latin typeface="Century Schoolbook" panose="02040604050505020304" pitchFamily="18" charset="0"/>
+                </a:rPr>
+                <a:t>Robot</a:t>
+              </a:r>
+              <a:endParaRPr lang="it-IT" sz="1400" i="1" dirty="0">
+                <a:solidFill>
+                  <a:schemeClr val="tx1"/>
+                </a:solidFill>
+                <a:latin typeface="Century Schoolbook" panose="02040604050505020304" pitchFamily="18" charset="0"/>
+              </a:endParaRPr>
+            </a:p>
+          </p:txBody>
+        </p:sp>
+        <p:sp>
+          <p:nvSpPr>
+            <p:cNvPr id="67" name="Triangolo isoscele 66"/>
+            <p:cNvSpPr/>
+            <p:nvPr/>
+          </p:nvSpPr>
+          <p:spPr>
+            <a:xfrm rot="16200000">
+              <a:off x="1350190" y="5205064"/>
+              <a:ext cx="296478" cy="255585"/>
+            </a:xfrm>
+            <a:prstGeom prst="triangle">
+              <a:avLst/>
+            </a:prstGeom>
+            <a:solidFill>
+              <a:srgbClr val="FF0000"/>
+            </a:solidFill>
+            <a:ln w="12700">
+              <a:solidFill>
+                <a:schemeClr val="tx1"/>
+              </a:solidFill>
+            </a:ln>
+          </p:spPr>
+          <p:style>
+            <a:lnRef idx="2">
+              <a:schemeClr val="accent1">
+                <a:shade val="50000"/>
+              </a:schemeClr>
+            </a:lnRef>
+            <a:fillRef idx="1">
+              <a:schemeClr val="accent1"/>
+            </a:fillRef>
+            <a:effectRef idx="0">
+              <a:schemeClr val="accent1"/>
+            </a:effectRef>
+            <a:fontRef idx="minor">
+              <a:schemeClr val="lt1"/>
+            </a:fontRef>
+          </p:style>
+          <p:txBody>
+            <a:bodyPr rtlCol="0" anchor="ctr"/>
+            <a:lstStyle/>
+            <a:p>
+              <a:pPr algn="ctr"/>
+              <a:endParaRPr lang="it-IT"/>
+            </a:p>
+          </p:txBody>
+        </p:sp>
+        <p:sp>
+          <p:nvSpPr>
+            <p:cNvPr id="68" name="Rettangolo 67"/>
+            <p:cNvSpPr/>
+            <p:nvPr/>
+          </p:nvSpPr>
+          <p:spPr>
+            <a:xfrm>
+              <a:off x="402476" y="5739696"/>
+              <a:ext cx="530961" cy="252254"/>
+            </a:xfrm>
+            <a:prstGeom prst="rect">
+              <a:avLst/>
+            </a:prstGeom>
+            <a:solidFill>
+              <a:schemeClr val="accent2">
+                <a:lumMod val="20000"/>
+                <a:lumOff val="80000"/>
+              </a:schemeClr>
+            </a:solidFill>
+            <a:ln w="12700">
+              <a:solidFill>
+                <a:schemeClr val="tx1"/>
+              </a:solidFill>
+            </a:ln>
+          </p:spPr>
+          <p:style>
+            <a:lnRef idx="2">
+              <a:schemeClr val="accent1">
+                <a:shade val="50000"/>
+              </a:schemeClr>
+            </a:lnRef>
+            <a:fillRef idx="1">
+              <a:schemeClr val="accent1"/>
+            </a:fillRef>
+            <a:effectRef idx="0">
+              <a:schemeClr val="accent1"/>
+            </a:effectRef>
+            <a:fontRef idx="minor">
+              <a:schemeClr val="lt1"/>
+            </a:fontRef>
+          </p:style>
+          <p:txBody>
+            <a:bodyPr rtlCol="0" anchor="ctr"/>
+            <a:lstStyle/>
+            <a:p>
+              <a:pPr algn="ctr"/>
+              <a:endParaRPr lang="it-IT"/>
+            </a:p>
+          </p:txBody>
+        </p:sp>
+      </p:grpSp>
+      <p:grpSp>
+        <p:nvGrpSpPr>
+          <p:cNvPr id="69" name="Gruppo 68"/>
+          <p:cNvGrpSpPr/>
+          <p:nvPr/>
+        </p:nvGrpSpPr>
+        <p:grpSpPr>
+          <a:xfrm>
+            <a:off x="5336979" y="2746782"/>
+            <a:ext cx="844768" cy="342073"/>
+            <a:chOff x="8144484" y="4563130"/>
+            <a:chExt cx="844768" cy="342073"/>
+          </a:xfrm>
+        </p:grpSpPr>
+        <p:cxnSp>
+          <p:nvCxnSpPr>
+            <p:cNvPr id="70" name="Connettore 2 69"/>
+            <p:cNvCxnSpPr/>
+            <p:nvPr/>
+          </p:nvCxnSpPr>
+          <p:spPr>
+            <a:xfrm flipV="1">
+              <a:off x="8144484" y="4634422"/>
+              <a:ext cx="721852" cy="2"/>
+            </a:xfrm>
+            <a:prstGeom prst="straightConnector1">
+              <a:avLst/>
+            </a:prstGeom>
+            <a:ln w="19050">
+              <a:solidFill>
+                <a:schemeClr val="tx1"/>
+              </a:solidFill>
+              <a:headEnd type="none" w="med" len="med"/>
+              <a:tailEnd type="none" w="med" len="med"/>
+            </a:ln>
+          </p:spPr>
+          <p:style>
+            <a:lnRef idx="1">
+              <a:schemeClr val="accent1"/>
+            </a:lnRef>
+            <a:fillRef idx="0">
+              <a:schemeClr val="accent1"/>
+            </a:fillRef>
+            <a:effectRef idx="0">
+              <a:schemeClr val="accent1"/>
+            </a:effectRef>
+            <a:fontRef idx="minor">
+              <a:schemeClr val="tx1"/>
+            </a:fontRef>
+          </p:style>
+        </p:cxnSp>
+        <p:sp>
+          <p:nvSpPr>
+            <p:cNvPr id="71" name="Triangolo isoscele 70"/>
+            <p:cNvSpPr/>
+            <p:nvPr/>
+          </p:nvSpPr>
+          <p:spPr>
+            <a:xfrm rot="16200000" flipV="1">
+              <a:off x="8856502" y="4572964"/>
+              <a:ext cx="142583" cy="122916"/>
+            </a:xfrm>
+            <a:prstGeom prst="triangle">
+              <a:avLst/>
+            </a:prstGeom>
+            <a:solidFill>
+              <a:schemeClr val="bg1"/>
+            </a:solidFill>
+            <a:ln w="15875">
+              <a:solidFill>
+                <a:schemeClr val="tx1"/>
+              </a:solidFill>
+            </a:ln>
+          </p:spPr>
+          <p:style>
+            <a:lnRef idx="2">
+              <a:schemeClr val="accent1">
+                <a:shade val="50000"/>
+              </a:schemeClr>
+            </a:lnRef>
+            <a:fillRef idx="1">
+              <a:schemeClr val="accent1"/>
+            </a:fillRef>
+            <a:effectRef idx="0">
+              <a:schemeClr val="accent1"/>
+            </a:effectRef>
+            <a:fontRef idx="minor">
+              <a:schemeClr val="lt1"/>
+            </a:fontRef>
+          </p:style>
+          <p:txBody>
+            <a:bodyPr rtlCol="0" anchor="ctr"/>
+            <a:lstStyle/>
+            <a:p>
+              <a:pPr algn="ctr"/>
+              <a:endParaRPr lang="it-IT"/>
+            </a:p>
+          </p:txBody>
+        </p:sp>
+        <p:cxnSp>
+          <p:nvCxnSpPr>
+            <p:cNvPr id="72" name="Connettore 2 71"/>
+            <p:cNvCxnSpPr/>
+            <p:nvPr/>
+          </p:nvCxnSpPr>
+          <p:spPr>
+            <a:xfrm flipV="1">
+              <a:off x="8267400" y="4833910"/>
+              <a:ext cx="721852" cy="2"/>
+            </a:xfrm>
+            <a:prstGeom prst="straightConnector1">
+              <a:avLst/>
+            </a:prstGeom>
+            <a:ln w="19050">
+              <a:solidFill>
+                <a:schemeClr val="tx1"/>
+              </a:solidFill>
+              <a:prstDash val="sysDash"/>
+              <a:headEnd type="none" w="med" len="med"/>
+              <a:tailEnd type="none" w="med" len="med"/>
+            </a:ln>
+          </p:spPr>
+          <p:style>
+            <a:lnRef idx="1">
+              <a:schemeClr val="accent1"/>
+            </a:lnRef>
+            <a:fillRef idx="0">
+              <a:schemeClr val="accent1"/>
+            </a:fillRef>
+            <a:effectRef idx="0">
+              <a:schemeClr val="accent1"/>
+            </a:effectRef>
+            <a:fontRef idx="minor">
+              <a:schemeClr val="tx1"/>
+            </a:fontRef>
+          </p:style>
+        </p:cxnSp>
+        <p:sp>
+          <p:nvSpPr>
+            <p:cNvPr id="73" name="Triangolo isoscele 72"/>
+            <p:cNvSpPr/>
+            <p:nvPr/>
+          </p:nvSpPr>
+          <p:spPr>
+            <a:xfrm rot="5400000" flipH="1" flipV="1">
+              <a:off x="8167744" y="4772454"/>
+              <a:ext cx="142583" cy="122916"/>
+            </a:xfrm>
+            <a:prstGeom prst="triangle">
+              <a:avLst/>
+            </a:prstGeom>
+            <a:solidFill>
+              <a:schemeClr val="bg1"/>
+            </a:solidFill>
+            <a:ln w="15875">
+              <a:solidFill>
+                <a:schemeClr val="tx1"/>
+              </a:solidFill>
+            </a:ln>
+          </p:spPr>
+          <p:style>
+            <a:lnRef idx="2">
+              <a:schemeClr val="accent1">
+                <a:shade val="50000"/>
+              </a:schemeClr>
+            </a:lnRef>
+            <a:fillRef idx="1">
+              <a:schemeClr val="accent1"/>
+            </a:fillRef>
+            <a:effectRef idx="0">
+              <a:schemeClr val="accent1"/>
+            </a:effectRef>
+            <a:fontRef idx="minor">
+              <a:schemeClr val="lt1"/>
+            </a:fontRef>
+          </p:style>
+          <p:txBody>
+            <a:bodyPr rtlCol="0" anchor="ctr"/>
+            <a:lstStyle/>
+            <a:p>
+              <a:pPr algn="ctr"/>
+              <a:endParaRPr lang="it-IT"/>
+            </a:p>
+          </p:txBody>
+        </p:sp>
+      </p:grpSp>
+      <p:cxnSp>
+        <p:nvCxnSpPr>
+          <p:cNvPr id="80" name="Connettore 2 79"/>
+          <p:cNvCxnSpPr/>
+          <p:nvPr/>
+        </p:nvCxnSpPr>
+        <p:spPr>
+          <a:xfrm>
+            <a:off x="5336979" y="3436717"/>
+            <a:ext cx="945711" cy="0"/>
+          </a:xfrm>
+          <a:prstGeom prst="straightConnector1">
+            <a:avLst/>
+          </a:prstGeom>
+          <a:ln w="19050">
+            <a:solidFill>
+              <a:schemeClr val="tx1"/>
+            </a:solidFill>
+            <a:prstDash val="sysDash"/>
+            <a:headEnd type="none" w="med" len="med"/>
+            <a:tailEnd type="arrow" w="med" len="med"/>
+          </a:ln>
+        </p:spPr>
+        <p:style>
+          <a:lnRef idx="1">
+            <a:schemeClr val="accent1"/>
+          </a:lnRef>
+          <a:fillRef idx="0">
+            <a:schemeClr val="accent1"/>
+          </a:fillRef>
+          <a:effectRef idx="0">
+            <a:schemeClr val="accent1"/>
+          </a:effectRef>
+          <a:fontRef idx="minor">
+            <a:schemeClr val="tx1"/>
+          </a:fontRef>
+        </p:style>
+      </p:cxnSp>
+      <p:sp>
+        <p:nvSpPr>
+          <p:cNvPr id="81" name="CasellaDiTesto 80"/>
+          <p:cNvSpPr txBox="1"/>
+          <p:nvPr/>
+        </p:nvSpPr>
+        <p:spPr>
+          <a:xfrm>
+            <a:off x="5335725" y="2388197"/>
+            <a:ext cx="979755" cy="276999"/>
+          </a:xfrm>
+          <a:prstGeom prst="rect">
+            <a:avLst/>
+          </a:prstGeom>
+          <a:noFill/>
+        </p:spPr>
+        <p:txBody>
+          <a:bodyPr wrap="none" rtlCol="0">
+            <a:spAutoFit/>
+          </a:bodyPr>
+          <a:lstStyle/>
+          <a:p>
+            <a:r>
+              <a:rPr lang="it-IT" sz="1200" dirty="0" smtClean="0">
+                <a:solidFill>
+                  <a:schemeClr val="accent1">
+                    <a:lumMod val="75000"/>
+                  </a:schemeClr>
+                </a:solidFill>
+                <a:latin typeface="Bookman Old Style" panose="02050604050505020204" pitchFamily="18" charset="0"/>
+              </a:rPr>
+              <a:t>step( 350 )</a:t>
+            </a:r>
+            <a:endParaRPr lang="it-IT" sz="1200" dirty="0">
+              <a:solidFill>
+                <a:schemeClr val="accent1">
+                  <a:lumMod val="75000"/>
+                </a:schemeClr>
+              </a:solidFill>
+              <a:latin typeface="Bookman Old Style" panose="02050604050505020204" pitchFamily="18" charset="0"/>
+            </a:endParaRPr>
+          </a:p>
+        </p:txBody>
+      </p:sp>
+      <p:sp>
+        <p:nvSpPr>
+          <p:cNvPr id="82" name="CasellaDiTesto 81"/>
+          <p:cNvSpPr txBox="1"/>
+          <p:nvPr/>
+        </p:nvSpPr>
+        <p:spPr>
+          <a:xfrm>
+            <a:off x="5447523" y="3515779"/>
+            <a:ext cx="764953" cy="461665"/>
+          </a:xfrm>
+          <a:prstGeom prst="rect">
+            <a:avLst/>
+          </a:prstGeom>
+          <a:noFill/>
+        </p:spPr>
+        <p:txBody>
+          <a:bodyPr wrap="none" rtlCol="0">
+            <a:spAutoFit/>
+          </a:bodyPr>
+          <a:lstStyle/>
+          <a:p>
+            <a:r>
+              <a:rPr lang="it-IT" sz="1200" dirty="0" smtClean="0">
+                <a:solidFill>
+                  <a:schemeClr val="accent1">
+                    <a:lumMod val="75000"/>
+                  </a:schemeClr>
+                </a:solidFill>
+                <a:latin typeface="Bookman Old Style" panose="02050604050505020204" pitchFamily="18" charset="0"/>
+              </a:rPr>
+              <a:t>cmd( l )</a:t>
+            </a:r>
+          </a:p>
+          <a:p>
+            <a:r>
+              <a:rPr lang="it-IT" sz="1200" dirty="0" smtClean="0">
+                <a:solidFill>
+                  <a:schemeClr val="accent1">
+                    <a:lumMod val="75000"/>
+                  </a:schemeClr>
+                </a:solidFill>
+                <a:latin typeface="Bookman Old Style" panose="02050604050505020204" pitchFamily="18" charset="0"/>
+              </a:rPr>
+              <a:t>cmd( r )</a:t>
+            </a:r>
+            <a:endParaRPr lang="it-IT" sz="1200" dirty="0">
+              <a:solidFill>
+                <a:schemeClr val="accent1">
+                  <a:lumMod val="75000"/>
+                </a:schemeClr>
+              </a:solidFill>
+              <a:latin typeface="Bookman Old Style" panose="02050604050505020204" pitchFamily="18" charset="0"/>
+            </a:endParaRPr>
+          </a:p>
+        </p:txBody>
+      </p:sp>
+    </p:spTree>
+    <p:extLst>
+      <p:ext uri="{BB962C8B-B14F-4D97-AF65-F5344CB8AC3E}">
+        <p14:creationId xmlns:p14="http://schemas.microsoft.com/office/powerpoint/2010/main" val="896678202"/>
+      </p:ext>
+    </p:extLst>
+  </p:cSld>
+  <p:clrMapOvr>
+    <a:masterClrMapping/>
+  </p:clrMapOvr>
+</p:sld>
+</file>
+
 <file path=ppt/theme/theme1.xml><?xml version="1.0" encoding="utf-8"?>
 <a:theme xmlns:a="http://schemas.openxmlformats.org/drawingml/2006/main" name="Tema di Office">
   <a:themeElements>

</xml_diff>

<commit_message>
sensors and actuators documentation
</commit_message>
<xml_diff>
--- a/userDocs/img/final_task_schema.pptx
+++ b/userDocs/img/final_task_schema.pptx
@@ -13,6 +13,7 @@
     <p:sldId id="270" r:id="rId7"/>
     <p:sldId id="277" r:id="rId8"/>
     <p:sldId id="278" r:id="rId9"/>
+    <p:sldId id="279" r:id="rId10"/>
   </p:sldIdLst>
   <p:sldSz cx="12192000" cy="6858000"/>
   <p:notesSz cx="6858000" cy="9144000"/>
@@ -248,7 +249,7 @@
           <a:p>
             <a:fld id="{B54D5996-1787-4713-9AAF-D983FFC67929}" type="datetimeFigureOut">
               <a:rPr lang="it-IT" smtClean="0"/>
-              <a:t>28/07/2021</a:t>
+              <a:t>30/07/2021</a:t>
             </a:fld>
             <a:endParaRPr lang="it-IT"/>
           </a:p>
@@ -416,7 +417,7 @@
           <a:p>
             <a:fld id="{B54D5996-1787-4713-9AAF-D983FFC67929}" type="datetimeFigureOut">
               <a:rPr lang="it-IT" smtClean="0"/>
-              <a:t>28/07/2021</a:t>
+              <a:t>30/07/2021</a:t>
             </a:fld>
             <a:endParaRPr lang="it-IT"/>
           </a:p>
@@ -594,7 +595,7 @@
           <a:p>
             <a:fld id="{B54D5996-1787-4713-9AAF-D983FFC67929}" type="datetimeFigureOut">
               <a:rPr lang="it-IT" smtClean="0"/>
-              <a:t>28/07/2021</a:t>
+              <a:t>30/07/2021</a:t>
             </a:fld>
             <a:endParaRPr lang="it-IT"/>
           </a:p>
@@ -762,7 +763,7 @@
           <a:p>
             <a:fld id="{B54D5996-1787-4713-9AAF-D983FFC67929}" type="datetimeFigureOut">
               <a:rPr lang="it-IT" smtClean="0"/>
-              <a:t>28/07/2021</a:t>
+              <a:t>30/07/2021</a:t>
             </a:fld>
             <a:endParaRPr lang="it-IT"/>
           </a:p>
@@ -1007,7 +1008,7 @@
           <a:p>
             <a:fld id="{B54D5996-1787-4713-9AAF-D983FFC67929}" type="datetimeFigureOut">
               <a:rPr lang="it-IT" smtClean="0"/>
-              <a:t>28/07/2021</a:t>
+              <a:t>30/07/2021</a:t>
             </a:fld>
             <a:endParaRPr lang="it-IT"/>
           </a:p>
@@ -1236,7 +1237,7 @@
           <a:p>
             <a:fld id="{B54D5996-1787-4713-9AAF-D983FFC67929}" type="datetimeFigureOut">
               <a:rPr lang="it-IT" smtClean="0"/>
-              <a:t>28/07/2021</a:t>
+              <a:t>30/07/2021</a:t>
             </a:fld>
             <a:endParaRPr lang="it-IT"/>
           </a:p>
@@ -1600,7 +1601,7 @@
           <a:p>
             <a:fld id="{B54D5996-1787-4713-9AAF-D983FFC67929}" type="datetimeFigureOut">
               <a:rPr lang="it-IT" smtClean="0"/>
-              <a:t>28/07/2021</a:t>
+              <a:t>30/07/2021</a:t>
             </a:fld>
             <a:endParaRPr lang="it-IT"/>
           </a:p>
@@ -1717,7 +1718,7 @@
           <a:p>
             <a:fld id="{B54D5996-1787-4713-9AAF-D983FFC67929}" type="datetimeFigureOut">
               <a:rPr lang="it-IT" smtClean="0"/>
-              <a:t>28/07/2021</a:t>
+              <a:t>30/07/2021</a:t>
             </a:fld>
             <a:endParaRPr lang="it-IT"/>
           </a:p>
@@ -1812,7 +1813,7 @@
           <a:p>
             <a:fld id="{B54D5996-1787-4713-9AAF-D983FFC67929}" type="datetimeFigureOut">
               <a:rPr lang="it-IT" smtClean="0"/>
-              <a:t>28/07/2021</a:t>
+              <a:t>30/07/2021</a:t>
             </a:fld>
             <a:endParaRPr lang="it-IT"/>
           </a:p>
@@ -2087,7 +2088,7 @@
           <a:p>
             <a:fld id="{B54D5996-1787-4713-9AAF-D983FFC67929}" type="datetimeFigureOut">
               <a:rPr lang="it-IT" smtClean="0"/>
-              <a:t>28/07/2021</a:t>
+              <a:t>30/07/2021</a:t>
             </a:fld>
             <a:endParaRPr lang="it-IT"/>
           </a:p>
@@ -2339,7 +2340,7 @@
           <a:p>
             <a:fld id="{B54D5996-1787-4713-9AAF-D983FFC67929}" type="datetimeFigureOut">
               <a:rPr lang="it-IT" smtClean="0"/>
-              <a:t>28/07/2021</a:t>
+              <a:t>30/07/2021</a:t>
             </a:fld>
             <a:endParaRPr lang="it-IT"/>
           </a:p>
@@ -2550,7 +2551,7 @@
           <a:p>
             <a:fld id="{B54D5996-1787-4713-9AAF-D983FFC67929}" type="datetimeFigureOut">
               <a:rPr lang="it-IT" smtClean="0"/>
-              <a:t>28/07/2021</a:t>
+              <a:t>30/07/2021</a:t>
             </a:fld>
             <a:endParaRPr lang="it-IT"/>
           </a:p>
@@ -16181,6 +16182,1405 @@
 </p:sld>
 </file>
 
+<file path=ppt/slides/slide9.xml><?xml version="1.0" encoding="utf-8"?>
+<p:sld xmlns:a="http://schemas.openxmlformats.org/drawingml/2006/main" xmlns:r="http://schemas.openxmlformats.org/officeDocument/2006/relationships" xmlns:p="http://schemas.openxmlformats.org/presentationml/2006/main">
+  <p:cSld>
+    <p:spTree>
+      <p:nvGrpSpPr>
+        <p:cNvPr id="1" name=""/>
+        <p:cNvGrpSpPr/>
+        <p:nvPr/>
+      </p:nvGrpSpPr>
+      <p:grpSpPr>
+        <a:xfrm>
+          <a:off x="0" y="0"/>
+          <a:ext cx="0" cy="0"/>
+          <a:chOff x="0" y="0"/>
+          <a:chExt cx="0" cy="0"/>
+        </a:xfrm>
+      </p:grpSpPr>
+      <p:grpSp>
+        <p:nvGrpSpPr>
+          <p:cNvPr id="27" name="Gruppo 26"/>
+          <p:cNvGrpSpPr/>
+          <p:nvPr/>
+        </p:nvGrpSpPr>
+        <p:grpSpPr>
+          <a:xfrm>
+            <a:off x="1427008" y="3414623"/>
+            <a:ext cx="1926426" cy="1214172"/>
+            <a:chOff x="402476" y="3280190"/>
+            <a:chExt cx="1926426" cy="1214172"/>
+          </a:xfrm>
+        </p:grpSpPr>
+        <p:sp>
+          <p:nvSpPr>
+            <p:cNvPr id="28" name="Ovale 27"/>
+            <p:cNvSpPr/>
+            <p:nvPr/>
+          </p:nvSpPr>
+          <p:spPr>
+            <a:xfrm>
+              <a:off x="667957" y="3428429"/>
+              <a:ext cx="1660945" cy="1065933"/>
+            </a:xfrm>
+            <a:prstGeom prst="ellipse">
+              <a:avLst/>
+            </a:prstGeom>
+            <a:solidFill>
+              <a:schemeClr val="accent2">
+                <a:lumMod val="20000"/>
+                <a:lumOff val="80000"/>
+              </a:schemeClr>
+            </a:solidFill>
+            <a:ln w="12700">
+              <a:solidFill>
+                <a:schemeClr val="tx1"/>
+              </a:solidFill>
+            </a:ln>
+          </p:spPr>
+          <p:style>
+            <a:lnRef idx="2">
+              <a:schemeClr val="accent1">
+                <a:shade val="50000"/>
+              </a:schemeClr>
+            </a:lnRef>
+            <a:fillRef idx="1">
+              <a:schemeClr val="accent1"/>
+            </a:fillRef>
+            <a:effectRef idx="0">
+              <a:schemeClr val="accent1"/>
+            </a:effectRef>
+            <a:fontRef idx="minor">
+              <a:schemeClr val="lt1"/>
+            </a:fontRef>
+          </p:style>
+          <p:txBody>
+            <a:bodyPr rtlCol="0" anchor="ctr"/>
+            <a:lstStyle/>
+            <a:p>
+              <a:pPr algn="ctr"/>
+              <a:r>
+                <a:rPr lang="it-IT" sz="1200" dirty="0" smtClean="0">
+                  <a:solidFill>
+                    <a:schemeClr val="tx1"/>
+                  </a:solidFill>
+                  <a:latin typeface="Century Schoolbook" panose="02040604050505020304" pitchFamily="18" charset="0"/>
+                </a:rPr>
+                <a:t>Sonar</a:t>
+              </a:r>
+              <a:endParaRPr lang="it-IT" sz="1200" dirty="0">
+                <a:solidFill>
+                  <a:schemeClr val="tx1"/>
+                </a:solidFill>
+                <a:latin typeface="Century Schoolbook" panose="02040604050505020304" pitchFamily="18" charset="0"/>
+              </a:endParaRPr>
+            </a:p>
+            <a:p>
+              <a:pPr algn="ctr"/>
+              <a:r>
+                <a:rPr lang="it-IT" sz="1200" dirty="0" smtClean="0">
+                  <a:solidFill>
+                    <a:schemeClr val="tx1"/>
+                  </a:solidFill>
+                  <a:latin typeface="Century Schoolbook" panose="02040604050505020304" pitchFamily="18" charset="0"/>
+                </a:rPr>
+                <a:t>Actor</a:t>
+              </a:r>
+              <a:endParaRPr lang="it-IT" sz="1200" dirty="0">
+                <a:solidFill>
+                  <a:schemeClr val="tx1"/>
+                </a:solidFill>
+                <a:latin typeface="Century Schoolbook" panose="02040604050505020304" pitchFamily="18" charset="0"/>
+              </a:endParaRPr>
+            </a:p>
+          </p:txBody>
+        </p:sp>
+        <p:sp>
+          <p:nvSpPr>
+            <p:cNvPr id="29" name="Triangolo isoscele 28"/>
+            <p:cNvSpPr/>
+            <p:nvPr/>
+          </p:nvSpPr>
+          <p:spPr>
+            <a:xfrm rot="16200000">
+              <a:off x="1350190" y="3300636"/>
+              <a:ext cx="296478" cy="255585"/>
+            </a:xfrm>
+            <a:prstGeom prst="triangle">
+              <a:avLst/>
+            </a:prstGeom>
+            <a:solidFill>
+              <a:srgbClr val="FF0000"/>
+            </a:solidFill>
+            <a:ln w="12700">
+              <a:solidFill>
+                <a:schemeClr val="tx1"/>
+              </a:solidFill>
+            </a:ln>
+          </p:spPr>
+          <p:style>
+            <a:lnRef idx="2">
+              <a:schemeClr val="accent1">
+                <a:shade val="50000"/>
+              </a:schemeClr>
+            </a:lnRef>
+            <a:fillRef idx="1">
+              <a:schemeClr val="accent1"/>
+            </a:fillRef>
+            <a:effectRef idx="0">
+              <a:schemeClr val="accent1"/>
+            </a:effectRef>
+            <a:fontRef idx="minor">
+              <a:schemeClr val="lt1"/>
+            </a:fontRef>
+          </p:style>
+          <p:txBody>
+            <a:bodyPr rtlCol="0" anchor="ctr"/>
+            <a:lstStyle/>
+            <a:p>
+              <a:pPr algn="ctr"/>
+              <a:endParaRPr lang="it-IT"/>
+            </a:p>
+          </p:txBody>
+        </p:sp>
+        <p:sp>
+          <p:nvSpPr>
+            <p:cNvPr id="30" name="Rettangolo 29"/>
+            <p:cNvSpPr/>
+            <p:nvPr/>
+          </p:nvSpPr>
+          <p:spPr>
+            <a:xfrm>
+              <a:off x="402476" y="3835268"/>
+              <a:ext cx="530961" cy="252254"/>
+            </a:xfrm>
+            <a:prstGeom prst="rect">
+              <a:avLst/>
+            </a:prstGeom>
+            <a:solidFill>
+              <a:schemeClr val="accent2">
+                <a:lumMod val="20000"/>
+                <a:lumOff val="80000"/>
+              </a:schemeClr>
+            </a:solidFill>
+            <a:ln w="12700">
+              <a:solidFill>
+                <a:schemeClr val="tx1"/>
+              </a:solidFill>
+            </a:ln>
+          </p:spPr>
+          <p:style>
+            <a:lnRef idx="2">
+              <a:schemeClr val="accent1">
+                <a:shade val="50000"/>
+              </a:schemeClr>
+            </a:lnRef>
+            <a:fillRef idx="1">
+              <a:schemeClr val="accent1"/>
+            </a:fillRef>
+            <a:effectRef idx="0">
+              <a:schemeClr val="accent1"/>
+            </a:effectRef>
+            <a:fontRef idx="minor">
+              <a:schemeClr val="lt1"/>
+            </a:fontRef>
+          </p:style>
+          <p:txBody>
+            <a:bodyPr rtlCol="0" anchor="ctr"/>
+            <a:lstStyle/>
+            <a:p>
+              <a:pPr algn="ctr"/>
+              <a:endParaRPr lang="it-IT"/>
+            </a:p>
+          </p:txBody>
+        </p:sp>
+      </p:grpSp>
+      <p:grpSp>
+        <p:nvGrpSpPr>
+          <p:cNvPr id="31" name="Gruppo 30"/>
+          <p:cNvGrpSpPr/>
+          <p:nvPr/>
+        </p:nvGrpSpPr>
+        <p:grpSpPr>
+          <a:xfrm>
+            <a:off x="1377629" y="2143647"/>
+            <a:ext cx="1926426" cy="1214172"/>
+            <a:chOff x="402476" y="309828"/>
+            <a:chExt cx="1926426" cy="1214172"/>
+          </a:xfrm>
+        </p:grpSpPr>
+        <p:sp>
+          <p:nvSpPr>
+            <p:cNvPr id="32" name="Ovale 31"/>
+            <p:cNvSpPr/>
+            <p:nvPr/>
+          </p:nvSpPr>
+          <p:spPr>
+            <a:xfrm>
+              <a:off x="667957" y="458067"/>
+              <a:ext cx="1660945" cy="1065933"/>
+            </a:xfrm>
+            <a:prstGeom prst="ellipse">
+              <a:avLst/>
+            </a:prstGeom>
+            <a:solidFill>
+              <a:schemeClr val="accent2">
+                <a:lumMod val="20000"/>
+                <a:lumOff val="80000"/>
+              </a:schemeClr>
+            </a:solidFill>
+            <a:ln w="12700">
+              <a:solidFill>
+                <a:schemeClr val="tx1"/>
+              </a:solidFill>
+            </a:ln>
+          </p:spPr>
+          <p:style>
+            <a:lnRef idx="2">
+              <a:schemeClr val="accent1">
+                <a:shade val="50000"/>
+              </a:schemeClr>
+            </a:lnRef>
+            <a:fillRef idx="1">
+              <a:schemeClr val="accent1"/>
+            </a:fillRef>
+            <a:effectRef idx="0">
+              <a:schemeClr val="accent1"/>
+            </a:effectRef>
+            <a:fontRef idx="minor">
+              <a:schemeClr val="lt1"/>
+            </a:fontRef>
+          </p:style>
+          <p:txBody>
+            <a:bodyPr rtlCol="0" anchor="ctr"/>
+            <a:lstStyle/>
+            <a:p>
+              <a:pPr algn="ctr"/>
+              <a:r>
+                <a:rPr lang="it-IT" sz="1200" dirty="0" smtClean="0">
+                  <a:solidFill>
+                    <a:schemeClr val="tx1"/>
+                  </a:solidFill>
+                  <a:latin typeface="Century Schoolbook" panose="02040604050505020304" pitchFamily="18" charset="0"/>
+                </a:rPr>
+                <a:t>Weight</a:t>
+              </a:r>
+              <a:endParaRPr lang="it-IT" sz="1200" dirty="0">
+                <a:solidFill>
+                  <a:schemeClr val="tx1"/>
+                </a:solidFill>
+                <a:latin typeface="Century Schoolbook" panose="02040604050505020304" pitchFamily="18" charset="0"/>
+              </a:endParaRPr>
+            </a:p>
+            <a:p>
+              <a:pPr algn="ctr"/>
+              <a:r>
+                <a:rPr lang="it-IT" sz="1200" dirty="0" smtClean="0">
+                  <a:solidFill>
+                    <a:schemeClr val="tx1"/>
+                  </a:solidFill>
+                  <a:latin typeface="Century Schoolbook" panose="02040604050505020304" pitchFamily="18" charset="0"/>
+                </a:rPr>
+                <a:t>Actor</a:t>
+              </a:r>
+              <a:endParaRPr lang="it-IT" sz="1200" dirty="0">
+                <a:solidFill>
+                  <a:schemeClr val="tx1"/>
+                </a:solidFill>
+                <a:latin typeface="Century Schoolbook" panose="02040604050505020304" pitchFamily="18" charset="0"/>
+              </a:endParaRPr>
+            </a:p>
+          </p:txBody>
+        </p:sp>
+        <p:sp>
+          <p:nvSpPr>
+            <p:cNvPr id="33" name="Triangolo isoscele 32"/>
+            <p:cNvSpPr/>
+            <p:nvPr/>
+          </p:nvSpPr>
+          <p:spPr>
+            <a:xfrm rot="16200000">
+              <a:off x="1350190" y="330274"/>
+              <a:ext cx="296478" cy="255585"/>
+            </a:xfrm>
+            <a:prstGeom prst="triangle">
+              <a:avLst/>
+            </a:prstGeom>
+            <a:solidFill>
+              <a:srgbClr val="FF0000"/>
+            </a:solidFill>
+            <a:ln w="12700">
+              <a:solidFill>
+                <a:schemeClr val="tx1"/>
+              </a:solidFill>
+            </a:ln>
+          </p:spPr>
+          <p:style>
+            <a:lnRef idx="2">
+              <a:schemeClr val="accent1">
+                <a:shade val="50000"/>
+              </a:schemeClr>
+            </a:lnRef>
+            <a:fillRef idx="1">
+              <a:schemeClr val="accent1"/>
+            </a:fillRef>
+            <a:effectRef idx="0">
+              <a:schemeClr val="accent1"/>
+            </a:effectRef>
+            <a:fontRef idx="minor">
+              <a:schemeClr val="lt1"/>
+            </a:fontRef>
+          </p:style>
+          <p:txBody>
+            <a:bodyPr rtlCol="0" anchor="ctr"/>
+            <a:lstStyle/>
+            <a:p>
+              <a:pPr algn="ctr"/>
+              <a:endParaRPr lang="it-IT"/>
+            </a:p>
+          </p:txBody>
+        </p:sp>
+        <p:sp>
+          <p:nvSpPr>
+            <p:cNvPr id="34" name="Rettangolo 33"/>
+            <p:cNvSpPr/>
+            <p:nvPr/>
+          </p:nvSpPr>
+          <p:spPr>
+            <a:xfrm>
+              <a:off x="402476" y="864906"/>
+              <a:ext cx="530961" cy="252254"/>
+            </a:xfrm>
+            <a:prstGeom prst="rect">
+              <a:avLst/>
+            </a:prstGeom>
+            <a:solidFill>
+              <a:schemeClr val="accent2">
+                <a:lumMod val="20000"/>
+                <a:lumOff val="80000"/>
+              </a:schemeClr>
+            </a:solidFill>
+            <a:ln w="12700">
+              <a:solidFill>
+                <a:schemeClr val="tx1"/>
+              </a:solidFill>
+            </a:ln>
+          </p:spPr>
+          <p:style>
+            <a:lnRef idx="2">
+              <a:schemeClr val="accent1">
+                <a:shade val="50000"/>
+              </a:schemeClr>
+            </a:lnRef>
+            <a:fillRef idx="1">
+              <a:schemeClr val="accent1"/>
+            </a:fillRef>
+            <a:effectRef idx="0">
+              <a:schemeClr val="accent1"/>
+            </a:effectRef>
+            <a:fontRef idx="minor">
+              <a:schemeClr val="lt1"/>
+            </a:fontRef>
+          </p:style>
+          <p:txBody>
+            <a:bodyPr rtlCol="0" anchor="ctr"/>
+            <a:lstStyle/>
+            <a:p>
+              <a:pPr algn="ctr"/>
+              <a:endParaRPr lang="it-IT"/>
+            </a:p>
+          </p:txBody>
+        </p:sp>
+      </p:grpSp>
+      <p:grpSp>
+        <p:nvGrpSpPr>
+          <p:cNvPr id="35" name="Gruppo 34"/>
+          <p:cNvGrpSpPr/>
+          <p:nvPr/>
+        </p:nvGrpSpPr>
+        <p:grpSpPr>
+          <a:xfrm>
+            <a:off x="4664438" y="2705067"/>
+            <a:ext cx="1926426" cy="1214172"/>
+            <a:chOff x="402476" y="5184618"/>
+            <a:chExt cx="1926426" cy="1214172"/>
+          </a:xfrm>
+        </p:grpSpPr>
+        <p:sp>
+          <p:nvSpPr>
+            <p:cNvPr id="36" name="Ovale 35"/>
+            <p:cNvSpPr/>
+            <p:nvPr/>
+          </p:nvSpPr>
+          <p:spPr>
+            <a:xfrm>
+              <a:off x="667957" y="5332857"/>
+              <a:ext cx="1660945" cy="1065933"/>
+            </a:xfrm>
+            <a:prstGeom prst="ellipse">
+              <a:avLst/>
+            </a:prstGeom>
+            <a:solidFill>
+              <a:schemeClr val="accent2">
+                <a:lumMod val="20000"/>
+                <a:lumOff val="80000"/>
+              </a:schemeClr>
+            </a:solidFill>
+            <a:ln w="12700">
+              <a:solidFill>
+                <a:schemeClr val="tx1"/>
+              </a:solidFill>
+            </a:ln>
+          </p:spPr>
+          <p:style>
+            <a:lnRef idx="2">
+              <a:schemeClr val="accent1">
+                <a:shade val="50000"/>
+              </a:schemeClr>
+            </a:lnRef>
+            <a:fillRef idx="1">
+              <a:schemeClr val="accent1"/>
+            </a:fillRef>
+            <a:effectRef idx="0">
+              <a:schemeClr val="accent1"/>
+            </a:effectRef>
+            <a:fontRef idx="minor">
+              <a:schemeClr val="lt1"/>
+            </a:fontRef>
+          </p:style>
+          <p:txBody>
+            <a:bodyPr rtlCol="0" anchor="ctr"/>
+            <a:lstStyle/>
+            <a:p>
+              <a:pPr algn="ctr"/>
+              <a:r>
+                <a:rPr lang="it-IT" sz="1200" dirty="0" smtClean="0">
+                  <a:solidFill>
+                    <a:schemeClr val="tx1"/>
+                  </a:solidFill>
+                  <a:latin typeface="Century Schoolbook" panose="02040604050505020304" pitchFamily="18" charset="0"/>
+                </a:rPr>
+                <a:t>Sensors Broker Actor</a:t>
+              </a:r>
+              <a:endParaRPr lang="it-IT" sz="1400" i="1" dirty="0">
+                <a:solidFill>
+                  <a:schemeClr val="tx1"/>
+                </a:solidFill>
+                <a:latin typeface="Century Schoolbook" panose="02040604050505020304" pitchFamily="18" charset="0"/>
+              </a:endParaRPr>
+            </a:p>
+          </p:txBody>
+        </p:sp>
+        <p:sp>
+          <p:nvSpPr>
+            <p:cNvPr id="37" name="Triangolo isoscele 36"/>
+            <p:cNvSpPr/>
+            <p:nvPr/>
+          </p:nvSpPr>
+          <p:spPr>
+            <a:xfrm rot="16200000">
+              <a:off x="1350190" y="5205064"/>
+              <a:ext cx="296478" cy="255585"/>
+            </a:xfrm>
+            <a:prstGeom prst="triangle">
+              <a:avLst/>
+            </a:prstGeom>
+            <a:solidFill>
+              <a:srgbClr val="FF0000"/>
+            </a:solidFill>
+            <a:ln w="12700">
+              <a:solidFill>
+                <a:schemeClr val="tx1"/>
+              </a:solidFill>
+            </a:ln>
+          </p:spPr>
+          <p:style>
+            <a:lnRef idx="2">
+              <a:schemeClr val="accent1">
+                <a:shade val="50000"/>
+              </a:schemeClr>
+            </a:lnRef>
+            <a:fillRef idx="1">
+              <a:schemeClr val="accent1"/>
+            </a:fillRef>
+            <a:effectRef idx="0">
+              <a:schemeClr val="accent1"/>
+            </a:effectRef>
+            <a:fontRef idx="minor">
+              <a:schemeClr val="lt1"/>
+            </a:fontRef>
+          </p:style>
+          <p:txBody>
+            <a:bodyPr rtlCol="0" anchor="ctr"/>
+            <a:lstStyle/>
+            <a:p>
+              <a:pPr algn="ctr"/>
+              <a:endParaRPr lang="it-IT"/>
+            </a:p>
+          </p:txBody>
+        </p:sp>
+        <p:sp>
+          <p:nvSpPr>
+            <p:cNvPr id="38" name="Rettangolo 37"/>
+            <p:cNvSpPr/>
+            <p:nvPr/>
+          </p:nvSpPr>
+          <p:spPr>
+            <a:xfrm>
+              <a:off x="402476" y="5739696"/>
+              <a:ext cx="530961" cy="252254"/>
+            </a:xfrm>
+            <a:prstGeom prst="rect">
+              <a:avLst/>
+            </a:prstGeom>
+            <a:solidFill>
+              <a:schemeClr val="accent2">
+                <a:lumMod val="20000"/>
+                <a:lumOff val="80000"/>
+              </a:schemeClr>
+            </a:solidFill>
+            <a:ln w="12700">
+              <a:solidFill>
+                <a:schemeClr val="tx1"/>
+              </a:solidFill>
+            </a:ln>
+          </p:spPr>
+          <p:style>
+            <a:lnRef idx="2">
+              <a:schemeClr val="accent1">
+                <a:shade val="50000"/>
+              </a:schemeClr>
+            </a:lnRef>
+            <a:fillRef idx="1">
+              <a:schemeClr val="accent1"/>
+            </a:fillRef>
+            <a:effectRef idx="0">
+              <a:schemeClr val="accent1"/>
+            </a:effectRef>
+            <a:fontRef idx="minor">
+              <a:schemeClr val="lt1"/>
+            </a:fontRef>
+          </p:style>
+          <p:txBody>
+            <a:bodyPr rtlCol="0" anchor="ctr"/>
+            <a:lstStyle/>
+            <a:p>
+              <a:pPr algn="ctr"/>
+              <a:endParaRPr lang="it-IT"/>
+            </a:p>
+          </p:txBody>
+        </p:sp>
+      </p:grpSp>
+      <p:sp>
+        <p:nvSpPr>
+          <p:cNvPr id="39" name="Figura a mano libera 38"/>
+          <p:cNvSpPr/>
+          <p:nvPr/>
+        </p:nvSpPr>
+        <p:spPr>
+          <a:xfrm>
+            <a:off x="3488946" y="2534138"/>
+            <a:ext cx="990600" cy="638334"/>
+          </a:xfrm>
+          <a:custGeom>
+            <a:avLst/>
+            <a:gdLst>
+              <a:gd name="connsiteX0" fmla="*/ 0 w 990600"/>
+              <a:gd name="connsiteY0" fmla="*/ 439954 h 638334"/>
+              <a:gd name="connsiteX1" fmla="*/ 314325 w 990600"/>
+              <a:gd name="connsiteY1" fmla="*/ 439954 h 638334"/>
+              <a:gd name="connsiteX2" fmla="*/ 390525 w 990600"/>
+              <a:gd name="connsiteY2" fmla="*/ 1804 h 638334"/>
+              <a:gd name="connsiteX3" fmla="*/ 571500 w 990600"/>
+              <a:gd name="connsiteY3" fmla="*/ 630454 h 638334"/>
+              <a:gd name="connsiteX4" fmla="*/ 685800 w 990600"/>
+              <a:gd name="connsiteY4" fmla="*/ 354229 h 638334"/>
+              <a:gd name="connsiteX5" fmla="*/ 990600 w 990600"/>
+              <a:gd name="connsiteY5" fmla="*/ 344704 h 638334"/>
+            </a:gdLst>
+            <a:ahLst/>
+            <a:cxnLst>
+              <a:cxn ang="0">
+                <a:pos x="connsiteX0" y="connsiteY0"/>
+              </a:cxn>
+              <a:cxn ang="0">
+                <a:pos x="connsiteX1" y="connsiteY1"/>
+              </a:cxn>
+              <a:cxn ang="0">
+                <a:pos x="connsiteX2" y="connsiteY2"/>
+              </a:cxn>
+              <a:cxn ang="0">
+                <a:pos x="connsiteX3" y="connsiteY3"/>
+              </a:cxn>
+              <a:cxn ang="0">
+                <a:pos x="connsiteX4" y="connsiteY4"/>
+              </a:cxn>
+              <a:cxn ang="0">
+                <a:pos x="connsiteX5" y="connsiteY5"/>
+              </a:cxn>
+            </a:cxnLst>
+            <a:rect l="l" t="t" r="r" b="b"/>
+            <a:pathLst>
+              <a:path w="990600" h="638334">
+                <a:moveTo>
+                  <a:pt x="0" y="439954"/>
+                </a:moveTo>
+                <a:cubicBezTo>
+                  <a:pt x="124619" y="476466"/>
+                  <a:pt x="249238" y="512979"/>
+                  <a:pt x="314325" y="439954"/>
+                </a:cubicBezTo>
+                <a:cubicBezTo>
+                  <a:pt x="379412" y="366929"/>
+                  <a:pt x="347663" y="-29946"/>
+                  <a:pt x="390525" y="1804"/>
+                </a:cubicBezTo>
+                <a:cubicBezTo>
+                  <a:pt x="433387" y="33554"/>
+                  <a:pt x="522288" y="571717"/>
+                  <a:pt x="571500" y="630454"/>
+                </a:cubicBezTo>
+                <a:cubicBezTo>
+                  <a:pt x="620713" y="689192"/>
+                  <a:pt x="615950" y="401854"/>
+                  <a:pt x="685800" y="354229"/>
+                </a:cubicBezTo>
+                <a:cubicBezTo>
+                  <a:pt x="755650" y="306604"/>
+                  <a:pt x="873125" y="325654"/>
+                  <a:pt x="990600" y="344704"/>
+                </a:cubicBezTo>
+              </a:path>
+            </a:pathLst>
+          </a:custGeom>
+          <a:noFill/>
+          <a:ln w="15875">
+            <a:solidFill>
+              <a:schemeClr val="tx1"/>
+            </a:solidFill>
+            <a:tailEnd type="arrow"/>
+          </a:ln>
+        </p:spPr>
+        <p:style>
+          <a:lnRef idx="2">
+            <a:schemeClr val="accent1">
+              <a:shade val="50000"/>
+            </a:schemeClr>
+          </a:lnRef>
+          <a:fillRef idx="1">
+            <a:schemeClr val="accent1"/>
+          </a:fillRef>
+          <a:effectRef idx="0">
+            <a:schemeClr val="accent1"/>
+          </a:effectRef>
+          <a:fontRef idx="minor">
+            <a:schemeClr val="lt1"/>
+          </a:fontRef>
+        </p:style>
+        <p:txBody>
+          <a:bodyPr rtlCol="0" anchor="ctr"/>
+          <a:lstStyle/>
+          <a:p>
+            <a:pPr algn="ctr"/>
+            <a:endParaRPr lang="it-IT"/>
+          </a:p>
+        </p:txBody>
+      </p:sp>
+      <p:sp>
+        <p:nvSpPr>
+          <p:cNvPr id="40" name="Figura a mano libera 39"/>
+          <p:cNvSpPr/>
+          <p:nvPr/>
+        </p:nvSpPr>
+        <p:spPr>
+          <a:xfrm>
+            <a:off x="3592258" y="3471048"/>
+            <a:ext cx="990600" cy="638334"/>
+          </a:xfrm>
+          <a:custGeom>
+            <a:avLst/>
+            <a:gdLst>
+              <a:gd name="connsiteX0" fmla="*/ 0 w 990600"/>
+              <a:gd name="connsiteY0" fmla="*/ 439954 h 638334"/>
+              <a:gd name="connsiteX1" fmla="*/ 314325 w 990600"/>
+              <a:gd name="connsiteY1" fmla="*/ 439954 h 638334"/>
+              <a:gd name="connsiteX2" fmla="*/ 390525 w 990600"/>
+              <a:gd name="connsiteY2" fmla="*/ 1804 h 638334"/>
+              <a:gd name="connsiteX3" fmla="*/ 571500 w 990600"/>
+              <a:gd name="connsiteY3" fmla="*/ 630454 h 638334"/>
+              <a:gd name="connsiteX4" fmla="*/ 685800 w 990600"/>
+              <a:gd name="connsiteY4" fmla="*/ 354229 h 638334"/>
+              <a:gd name="connsiteX5" fmla="*/ 990600 w 990600"/>
+              <a:gd name="connsiteY5" fmla="*/ 344704 h 638334"/>
+            </a:gdLst>
+            <a:ahLst/>
+            <a:cxnLst>
+              <a:cxn ang="0">
+                <a:pos x="connsiteX0" y="connsiteY0"/>
+              </a:cxn>
+              <a:cxn ang="0">
+                <a:pos x="connsiteX1" y="connsiteY1"/>
+              </a:cxn>
+              <a:cxn ang="0">
+                <a:pos x="connsiteX2" y="connsiteY2"/>
+              </a:cxn>
+              <a:cxn ang="0">
+                <a:pos x="connsiteX3" y="connsiteY3"/>
+              </a:cxn>
+              <a:cxn ang="0">
+                <a:pos x="connsiteX4" y="connsiteY4"/>
+              </a:cxn>
+              <a:cxn ang="0">
+                <a:pos x="connsiteX5" y="connsiteY5"/>
+              </a:cxn>
+            </a:cxnLst>
+            <a:rect l="l" t="t" r="r" b="b"/>
+            <a:pathLst>
+              <a:path w="990600" h="638334">
+                <a:moveTo>
+                  <a:pt x="0" y="439954"/>
+                </a:moveTo>
+                <a:cubicBezTo>
+                  <a:pt x="124619" y="476466"/>
+                  <a:pt x="249238" y="512979"/>
+                  <a:pt x="314325" y="439954"/>
+                </a:cubicBezTo>
+                <a:cubicBezTo>
+                  <a:pt x="379412" y="366929"/>
+                  <a:pt x="347663" y="-29946"/>
+                  <a:pt x="390525" y="1804"/>
+                </a:cubicBezTo>
+                <a:cubicBezTo>
+                  <a:pt x="433387" y="33554"/>
+                  <a:pt x="522288" y="571717"/>
+                  <a:pt x="571500" y="630454"/>
+                </a:cubicBezTo>
+                <a:cubicBezTo>
+                  <a:pt x="620713" y="689192"/>
+                  <a:pt x="615950" y="401854"/>
+                  <a:pt x="685800" y="354229"/>
+                </a:cubicBezTo>
+                <a:cubicBezTo>
+                  <a:pt x="755650" y="306604"/>
+                  <a:pt x="873125" y="325654"/>
+                  <a:pt x="990600" y="344704"/>
+                </a:cubicBezTo>
+              </a:path>
+            </a:pathLst>
+          </a:custGeom>
+          <a:noFill/>
+          <a:ln w="15875">
+            <a:solidFill>
+              <a:schemeClr val="tx1"/>
+            </a:solidFill>
+            <a:tailEnd type="arrow"/>
+          </a:ln>
+        </p:spPr>
+        <p:style>
+          <a:lnRef idx="2">
+            <a:schemeClr val="accent1">
+              <a:shade val="50000"/>
+            </a:schemeClr>
+          </a:lnRef>
+          <a:fillRef idx="1">
+            <a:schemeClr val="accent1"/>
+          </a:fillRef>
+          <a:effectRef idx="0">
+            <a:schemeClr val="accent1"/>
+          </a:effectRef>
+          <a:fontRef idx="minor">
+            <a:schemeClr val="lt1"/>
+          </a:fontRef>
+        </p:style>
+        <p:txBody>
+          <a:bodyPr rtlCol="0" anchor="ctr"/>
+          <a:lstStyle/>
+          <a:p>
+            <a:pPr algn="ctr"/>
+            <a:endParaRPr lang="it-IT"/>
+          </a:p>
+        </p:txBody>
+      </p:sp>
+      <p:sp>
+        <p:nvSpPr>
+          <p:cNvPr id="41" name="CasellaDiTesto 40"/>
+          <p:cNvSpPr txBox="1"/>
+          <p:nvPr/>
+        </p:nvSpPr>
+        <p:spPr>
+          <a:xfrm>
+            <a:off x="3318885" y="2052726"/>
+            <a:ext cx="1375698" cy="461665"/>
+          </a:xfrm>
+          <a:prstGeom prst="rect">
+            <a:avLst/>
+          </a:prstGeom>
+          <a:noFill/>
+        </p:spPr>
+        <p:txBody>
+          <a:bodyPr wrap="none" rtlCol="0">
+            <a:spAutoFit/>
+          </a:bodyPr>
+          <a:lstStyle/>
+          <a:p>
+            <a:r>
+              <a:rPr lang="it-IT" sz="1200" dirty="0" smtClean="0">
+                <a:solidFill>
+                  <a:schemeClr val="accent1">
+                    <a:lumMod val="75000"/>
+                  </a:schemeClr>
+                </a:solidFill>
+                <a:latin typeface="Bookman Old Style" panose="02050604050505020204" pitchFamily="18" charset="0"/>
+              </a:rPr>
+              <a:t>indoorOccupied</a:t>
+            </a:r>
+            <a:endParaRPr lang="it-IT" sz="1200" dirty="0" smtClean="0">
+              <a:solidFill>
+                <a:schemeClr val="accent1">
+                  <a:lumMod val="75000"/>
+                </a:schemeClr>
+              </a:solidFill>
+              <a:latin typeface="Bookman Old Style" panose="02050604050505020204" pitchFamily="18" charset="0"/>
+            </a:endParaRPr>
+          </a:p>
+          <a:p>
+            <a:r>
+              <a:rPr lang="it-IT" sz="1200" dirty="0" smtClean="0">
+                <a:solidFill>
+                  <a:schemeClr val="accent1">
+                    <a:lumMod val="75000"/>
+                  </a:schemeClr>
+                </a:solidFill>
+                <a:latin typeface="Bookman Old Style" panose="02050604050505020204" pitchFamily="18" charset="0"/>
+              </a:rPr>
+              <a:t>indoorCleared</a:t>
+            </a:r>
+            <a:endParaRPr lang="it-IT" sz="1200" dirty="0">
+              <a:solidFill>
+                <a:schemeClr val="accent1">
+                  <a:lumMod val="75000"/>
+                </a:schemeClr>
+              </a:solidFill>
+              <a:latin typeface="Bookman Old Style" panose="02050604050505020204" pitchFamily="18" charset="0"/>
+            </a:endParaRPr>
+          </a:p>
+        </p:txBody>
+      </p:sp>
+      <p:sp>
+        <p:nvSpPr>
+          <p:cNvPr id="42" name="CasellaDiTesto 41"/>
+          <p:cNvSpPr txBox="1"/>
+          <p:nvPr/>
+        </p:nvSpPr>
+        <p:spPr>
+          <a:xfrm>
+            <a:off x="3453232" y="4109382"/>
+            <a:ext cx="1476686" cy="461665"/>
+          </a:xfrm>
+          <a:prstGeom prst="rect">
+            <a:avLst/>
+          </a:prstGeom>
+          <a:noFill/>
+        </p:spPr>
+        <p:txBody>
+          <a:bodyPr wrap="none" rtlCol="0">
+            <a:spAutoFit/>
+          </a:bodyPr>
+          <a:lstStyle/>
+          <a:p>
+            <a:r>
+              <a:rPr lang="it-IT" sz="1200" dirty="0" smtClean="0">
+                <a:solidFill>
+                  <a:schemeClr val="accent1">
+                    <a:lumMod val="75000"/>
+                  </a:schemeClr>
+                </a:solidFill>
+                <a:latin typeface="Bookman Old Style" panose="02050604050505020204" pitchFamily="18" charset="0"/>
+              </a:rPr>
+              <a:t>outdoorOccupied</a:t>
+            </a:r>
+            <a:endParaRPr lang="it-IT" sz="1200" dirty="0">
+              <a:solidFill>
+                <a:schemeClr val="accent1">
+                  <a:lumMod val="75000"/>
+                </a:schemeClr>
+              </a:solidFill>
+              <a:latin typeface="Bookman Old Style" panose="02050604050505020204" pitchFamily="18" charset="0"/>
+            </a:endParaRPr>
+          </a:p>
+          <a:p>
+            <a:r>
+              <a:rPr lang="it-IT" sz="1200" dirty="0" smtClean="0">
+                <a:solidFill>
+                  <a:schemeClr val="accent1">
+                    <a:lumMod val="75000"/>
+                  </a:schemeClr>
+                </a:solidFill>
+                <a:latin typeface="Bookman Old Style" panose="02050604050505020204" pitchFamily="18" charset="0"/>
+              </a:rPr>
+              <a:t>outdoorCleared</a:t>
+            </a:r>
+            <a:endParaRPr lang="it-IT" sz="1200" dirty="0">
+              <a:solidFill>
+                <a:schemeClr val="accent1">
+                  <a:lumMod val="75000"/>
+                </a:schemeClr>
+              </a:solidFill>
+              <a:latin typeface="Bookman Old Style" panose="02050604050505020204" pitchFamily="18" charset="0"/>
+            </a:endParaRPr>
+          </a:p>
+        </p:txBody>
+      </p:sp>
+      <p:grpSp>
+        <p:nvGrpSpPr>
+          <p:cNvPr id="43" name="Gruppo 42"/>
+          <p:cNvGrpSpPr/>
+          <p:nvPr/>
+        </p:nvGrpSpPr>
+        <p:grpSpPr>
+          <a:xfrm>
+            <a:off x="8852683" y="2698725"/>
+            <a:ext cx="1926426" cy="1214172"/>
+            <a:chOff x="402476" y="5184618"/>
+            <a:chExt cx="1926426" cy="1214172"/>
+          </a:xfrm>
+        </p:grpSpPr>
+        <p:sp>
+          <p:nvSpPr>
+            <p:cNvPr id="44" name="Ovale 43"/>
+            <p:cNvSpPr/>
+            <p:nvPr/>
+          </p:nvSpPr>
+          <p:spPr>
+            <a:xfrm>
+              <a:off x="667957" y="5332857"/>
+              <a:ext cx="1660945" cy="1065933"/>
+            </a:xfrm>
+            <a:prstGeom prst="ellipse">
+              <a:avLst/>
+            </a:prstGeom>
+            <a:solidFill>
+              <a:schemeClr val="accent2">
+                <a:lumMod val="20000"/>
+                <a:lumOff val="80000"/>
+              </a:schemeClr>
+            </a:solidFill>
+            <a:ln w="12700">
+              <a:solidFill>
+                <a:schemeClr val="tx1"/>
+              </a:solidFill>
+            </a:ln>
+          </p:spPr>
+          <p:style>
+            <a:lnRef idx="2">
+              <a:schemeClr val="accent1">
+                <a:shade val="50000"/>
+              </a:schemeClr>
+            </a:lnRef>
+            <a:fillRef idx="1">
+              <a:schemeClr val="accent1"/>
+            </a:fillRef>
+            <a:effectRef idx="0">
+              <a:schemeClr val="accent1"/>
+            </a:effectRef>
+            <a:fontRef idx="minor">
+              <a:schemeClr val="lt1"/>
+            </a:fontRef>
+          </p:style>
+          <p:txBody>
+            <a:bodyPr rtlCol="0" anchor="ctr"/>
+            <a:lstStyle/>
+            <a:p>
+              <a:pPr algn="ctr"/>
+              <a:r>
+                <a:rPr lang="it-IT" sz="1200" dirty="0" smtClean="0">
+                  <a:solidFill>
+                    <a:schemeClr val="tx1"/>
+                  </a:solidFill>
+                  <a:latin typeface="Century Schoolbook" panose="02040604050505020304" pitchFamily="18" charset="0"/>
+                </a:rPr>
+                <a:t>Park Manager Service</a:t>
+              </a:r>
+            </a:p>
+            <a:p>
+              <a:pPr algn="ctr"/>
+              <a:r>
+                <a:rPr lang="it-IT" sz="1100" i="1" dirty="0" smtClean="0">
+                  <a:solidFill>
+                    <a:schemeClr val="tx1"/>
+                  </a:solidFill>
+                  <a:latin typeface="Century Schoolbook" panose="02040604050505020304" pitchFamily="18" charset="0"/>
+                </a:rPr>
+                <a:t>(business logic)</a:t>
+              </a:r>
+              <a:endParaRPr lang="it-IT" sz="1400" i="1" dirty="0">
+                <a:solidFill>
+                  <a:schemeClr val="tx1"/>
+                </a:solidFill>
+                <a:latin typeface="Century Schoolbook" panose="02040604050505020304" pitchFamily="18" charset="0"/>
+              </a:endParaRPr>
+            </a:p>
+          </p:txBody>
+        </p:sp>
+        <p:sp>
+          <p:nvSpPr>
+            <p:cNvPr id="45" name="Triangolo isoscele 44"/>
+            <p:cNvSpPr/>
+            <p:nvPr/>
+          </p:nvSpPr>
+          <p:spPr>
+            <a:xfrm rot="16200000">
+              <a:off x="1350190" y="5205064"/>
+              <a:ext cx="296478" cy="255585"/>
+            </a:xfrm>
+            <a:prstGeom prst="triangle">
+              <a:avLst/>
+            </a:prstGeom>
+            <a:solidFill>
+              <a:srgbClr val="FF0000"/>
+            </a:solidFill>
+            <a:ln w="12700">
+              <a:solidFill>
+                <a:schemeClr val="tx1"/>
+              </a:solidFill>
+            </a:ln>
+          </p:spPr>
+          <p:style>
+            <a:lnRef idx="2">
+              <a:schemeClr val="accent1">
+                <a:shade val="50000"/>
+              </a:schemeClr>
+            </a:lnRef>
+            <a:fillRef idx="1">
+              <a:schemeClr val="accent1"/>
+            </a:fillRef>
+            <a:effectRef idx="0">
+              <a:schemeClr val="accent1"/>
+            </a:effectRef>
+            <a:fontRef idx="minor">
+              <a:schemeClr val="lt1"/>
+            </a:fontRef>
+          </p:style>
+          <p:txBody>
+            <a:bodyPr rtlCol="0" anchor="ctr"/>
+            <a:lstStyle/>
+            <a:p>
+              <a:pPr algn="ctr"/>
+              <a:endParaRPr lang="it-IT"/>
+            </a:p>
+          </p:txBody>
+        </p:sp>
+        <p:sp>
+          <p:nvSpPr>
+            <p:cNvPr id="46" name="Rettangolo 45"/>
+            <p:cNvSpPr/>
+            <p:nvPr/>
+          </p:nvSpPr>
+          <p:spPr>
+            <a:xfrm>
+              <a:off x="402476" y="5739696"/>
+              <a:ext cx="530961" cy="252254"/>
+            </a:xfrm>
+            <a:prstGeom prst="rect">
+              <a:avLst/>
+            </a:prstGeom>
+            <a:solidFill>
+              <a:schemeClr val="accent2">
+                <a:lumMod val="20000"/>
+                <a:lumOff val="80000"/>
+              </a:schemeClr>
+            </a:solidFill>
+            <a:ln w="12700">
+              <a:solidFill>
+                <a:schemeClr val="tx1"/>
+              </a:solidFill>
+            </a:ln>
+          </p:spPr>
+          <p:style>
+            <a:lnRef idx="2">
+              <a:schemeClr val="accent1">
+                <a:shade val="50000"/>
+              </a:schemeClr>
+            </a:lnRef>
+            <a:fillRef idx="1">
+              <a:schemeClr val="accent1"/>
+            </a:fillRef>
+            <a:effectRef idx="0">
+              <a:schemeClr val="accent1"/>
+            </a:effectRef>
+            <a:fontRef idx="minor">
+              <a:schemeClr val="lt1"/>
+            </a:fontRef>
+          </p:style>
+          <p:txBody>
+            <a:bodyPr rtlCol="0" anchor="ctr"/>
+            <a:lstStyle/>
+            <a:p>
+              <a:pPr algn="ctr"/>
+              <a:endParaRPr lang="it-IT"/>
+            </a:p>
+          </p:txBody>
+        </p:sp>
+      </p:grpSp>
+      <p:sp>
+        <p:nvSpPr>
+          <p:cNvPr id="47" name="CasellaDiTesto 46"/>
+          <p:cNvSpPr txBox="1"/>
+          <p:nvPr/>
+        </p:nvSpPr>
+        <p:spPr>
+          <a:xfrm>
+            <a:off x="6653079" y="2652329"/>
+            <a:ext cx="2071401" cy="461665"/>
+          </a:xfrm>
+          <a:prstGeom prst="rect">
+            <a:avLst/>
+          </a:prstGeom>
+          <a:noFill/>
+        </p:spPr>
+        <p:txBody>
+          <a:bodyPr wrap="none" rtlCol="0">
+            <a:spAutoFit/>
+          </a:bodyPr>
+          <a:lstStyle/>
+          <a:p>
+            <a:r>
+              <a:rPr lang="it-IT" sz="1200" dirty="0" smtClean="0">
+                <a:solidFill>
+                  <a:schemeClr val="accent1">
+                    <a:lumMod val="75000"/>
+                  </a:schemeClr>
+                </a:solidFill>
+                <a:latin typeface="Bookman Old Style" panose="02050604050505020204" pitchFamily="18" charset="0"/>
+              </a:rPr>
+              <a:t>indoorStatus( STATUS )</a:t>
+            </a:r>
+          </a:p>
+          <a:p>
+            <a:r>
+              <a:rPr lang="it-IT" sz="1200" dirty="0" smtClean="0">
+                <a:solidFill>
+                  <a:schemeClr val="accent1">
+                    <a:lumMod val="75000"/>
+                  </a:schemeClr>
+                </a:solidFill>
+                <a:latin typeface="Bookman Old Style" panose="02050604050505020204" pitchFamily="18" charset="0"/>
+              </a:rPr>
+              <a:t>outdoorStatus( STATUS )</a:t>
+            </a:r>
+            <a:endParaRPr lang="it-IT" sz="1200" dirty="0">
+              <a:solidFill>
+                <a:schemeClr val="accent1">
+                  <a:lumMod val="75000"/>
+                </a:schemeClr>
+              </a:solidFill>
+              <a:latin typeface="Bookman Old Style" panose="02050604050505020204" pitchFamily="18" charset="0"/>
+            </a:endParaRPr>
+          </a:p>
+        </p:txBody>
+      </p:sp>
+      <p:grpSp>
+        <p:nvGrpSpPr>
+          <p:cNvPr id="59" name="Gruppo 58"/>
+          <p:cNvGrpSpPr/>
+          <p:nvPr/>
+        </p:nvGrpSpPr>
+        <p:grpSpPr>
+          <a:xfrm>
+            <a:off x="6821715" y="3173790"/>
+            <a:ext cx="1800118" cy="342073"/>
+            <a:chOff x="6062590" y="2958130"/>
+            <a:chExt cx="1800118" cy="342073"/>
+          </a:xfrm>
+        </p:grpSpPr>
+        <p:cxnSp>
+          <p:nvCxnSpPr>
+            <p:cNvPr id="49" name="Connettore 2 48"/>
+            <p:cNvCxnSpPr/>
+            <p:nvPr/>
+          </p:nvCxnSpPr>
+          <p:spPr>
+            <a:xfrm flipH="1">
+              <a:off x="6185505" y="3029422"/>
+              <a:ext cx="1677203" cy="0"/>
+            </a:xfrm>
+            <a:prstGeom prst="straightConnector1">
+              <a:avLst/>
+            </a:prstGeom>
+            <a:ln w="19050">
+              <a:solidFill>
+                <a:schemeClr val="tx1"/>
+              </a:solidFill>
+              <a:headEnd type="none" w="med" len="med"/>
+              <a:tailEnd type="none" w="med" len="med"/>
+            </a:ln>
+          </p:spPr>
+          <p:style>
+            <a:lnRef idx="1">
+              <a:schemeClr val="accent1"/>
+            </a:lnRef>
+            <a:fillRef idx="0">
+              <a:schemeClr val="accent1"/>
+            </a:fillRef>
+            <a:effectRef idx="0">
+              <a:schemeClr val="accent1"/>
+            </a:effectRef>
+            <a:fontRef idx="minor">
+              <a:schemeClr val="tx1"/>
+            </a:fontRef>
+          </p:style>
+        </p:cxnSp>
+        <p:sp>
+          <p:nvSpPr>
+            <p:cNvPr id="50" name="Triangolo isoscele 49"/>
+            <p:cNvSpPr/>
+            <p:nvPr/>
+          </p:nvSpPr>
+          <p:spPr>
+            <a:xfrm rot="5400000" flipH="1" flipV="1">
+              <a:off x="6052756" y="2967964"/>
+              <a:ext cx="142583" cy="122916"/>
+            </a:xfrm>
+            <a:prstGeom prst="triangle">
+              <a:avLst/>
+            </a:prstGeom>
+            <a:solidFill>
+              <a:schemeClr val="bg1"/>
+            </a:solidFill>
+            <a:ln w="15875">
+              <a:solidFill>
+                <a:schemeClr val="tx1"/>
+              </a:solidFill>
+            </a:ln>
+          </p:spPr>
+          <p:style>
+            <a:lnRef idx="2">
+              <a:schemeClr val="accent1">
+                <a:shade val="50000"/>
+              </a:schemeClr>
+            </a:lnRef>
+            <a:fillRef idx="1">
+              <a:schemeClr val="accent1"/>
+            </a:fillRef>
+            <a:effectRef idx="0">
+              <a:schemeClr val="accent1"/>
+            </a:effectRef>
+            <a:fontRef idx="minor">
+              <a:schemeClr val="lt1"/>
+            </a:fontRef>
+          </p:style>
+          <p:txBody>
+            <a:bodyPr rtlCol="0" anchor="ctr"/>
+            <a:lstStyle/>
+            <a:p>
+              <a:pPr algn="ctr"/>
+              <a:endParaRPr lang="it-IT"/>
+            </a:p>
+          </p:txBody>
+        </p:sp>
+        <p:cxnSp>
+          <p:nvCxnSpPr>
+            <p:cNvPr id="51" name="Connettore 2 50"/>
+            <p:cNvCxnSpPr>
+              <a:stCxn id="52" idx="3"/>
+            </p:cNvCxnSpPr>
+            <p:nvPr/>
+          </p:nvCxnSpPr>
+          <p:spPr>
+            <a:xfrm flipH="1" flipV="1">
+              <a:off x="6062590" y="3228910"/>
+              <a:ext cx="1677202" cy="2"/>
+            </a:xfrm>
+            <a:prstGeom prst="straightConnector1">
+              <a:avLst/>
+            </a:prstGeom>
+            <a:ln w="19050">
+              <a:solidFill>
+                <a:schemeClr val="tx1"/>
+              </a:solidFill>
+              <a:prstDash val="sysDash"/>
+              <a:headEnd type="none" w="med" len="med"/>
+              <a:tailEnd type="none" w="med" len="med"/>
+            </a:ln>
+          </p:spPr>
+          <p:style>
+            <a:lnRef idx="1">
+              <a:schemeClr val="accent1"/>
+            </a:lnRef>
+            <a:fillRef idx="0">
+              <a:schemeClr val="accent1"/>
+            </a:fillRef>
+            <a:effectRef idx="0">
+              <a:schemeClr val="accent1"/>
+            </a:effectRef>
+            <a:fontRef idx="minor">
+              <a:schemeClr val="tx1"/>
+            </a:fontRef>
+          </p:style>
+        </p:cxnSp>
+        <p:sp>
+          <p:nvSpPr>
+            <p:cNvPr id="52" name="Triangolo isoscele 51"/>
+            <p:cNvSpPr/>
+            <p:nvPr/>
+          </p:nvSpPr>
+          <p:spPr>
+            <a:xfrm rot="16200000" flipV="1">
+              <a:off x="7729958" y="3167454"/>
+              <a:ext cx="142583" cy="122916"/>
+            </a:xfrm>
+            <a:prstGeom prst="triangle">
+              <a:avLst/>
+            </a:prstGeom>
+            <a:solidFill>
+              <a:schemeClr val="bg1"/>
+            </a:solidFill>
+            <a:ln w="15875">
+              <a:solidFill>
+                <a:schemeClr val="tx1"/>
+              </a:solidFill>
+            </a:ln>
+          </p:spPr>
+          <p:style>
+            <a:lnRef idx="2">
+              <a:schemeClr val="accent1">
+                <a:shade val="50000"/>
+              </a:schemeClr>
+            </a:lnRef>
+            <a:fillRef idx="1">
+              <a:schemeClr val="accent1"/>
+            </a:fillRef>
+            <a:effectRef idx="0">
+              <a:schemeClr val="accent1"/>
+            </a:effectRef>
+            <a:fontRef idx="minor">
+              <a:schemeClr val="lt1"/>
+            </a:fontRef>
+          </p:style>
+          <p:txBody>
+            <a:bodyPr rtlCol="0" anchor="ctr"/>
+            <a:lstStyle/>
+            <a:p>
+              <a:pPr algn="ctr"/>
+              <a:endParaRPr lang="it-IT"/>
+            </a:p>
+          </p:txBody>
+        </p:sp>
+      </p:grpSp>
+    </p:spTree>
+    <p:extLst>
+      <p:ext uri="{BB962C8B-B14F-4D97-AF65-F5344CB8AC3E}">
+        <p14:creationId xmlns:p14="http://schemas.microsoft.com/office/powerpoint/2010/main" val="617578794"/>
+      </p:ext>
+    </p:extLst>
+  </p:cSld>
+  <p:clrMapOvr>
+    <a:masterClrMapping/>
+  </p:clrMapOvr>
+</p:sld>
+</file>
+
 <file path=ppt/theme/theme1.xml><?xml version="1.0" encoding="utf-8"?>
 <a:theme xmlns:a="http://schemas.openxmlformats.org/drawingml/2006/main" name="Tema di Office">
   <a:themeElements>

</xml_diff>